<commit_message>
Support direct range notation
</commit_message>
<xml_diff>
--- a/test/data2/in.pptx
+++ b/test/data2/in.pptx
@@ -687,6 +687,1151 @@
 </file>
 
 <file path=ppt/charts/chart2.xml><?xml version="1.0" encoding="utf-8"?>
+<c:chartSpace xmlns:c="http://schemas.openxmlformats.org/drawingml/2006/chart" xmlns:a="http://schemas.openxmlformats.org/drawingml/2006/main" xmlns:r="http://schemas.openxmlformats.org/officeDocument/2006/relationships" xmlns:c16r2="http://schemas.microsoft.com/office/drawing/2015/06/chart">
+  <c:date1904 val="0"/>
+  <c:lang val="ja-JP"/>
+  <c:roundedCorners val="0"/>
+  <mc:AlternateContent xmlns:mc="http://schemas.openxmlformats.org/markup-compatibility/2006">
+    <mc:Choice xmlns:c14="http://schemas.microsoft.com/office/drawing/2007/8/2/chart" Requires="c14">
+      <c14:style val="102"/>
+    </mc:Choice>
+    <mc:Fallback>
+      <c:style val="2"/>
+    </mc:Fallback>
+  </mc:AlternateContent>
+  <c:chart>
+    <c:title>
+      <c:tx>
+        <c:rich>
+          <a:bodyPr rot="0" spcFirstLastPara="1" vertOverflow="ellipsis" vert="horz" wrap="square" anchor="ctr" anchorCtr="1"/>
+          <a:lstStyle/>
+          <a:p>
+            <a:pPr>
+              <a:defRPr sz="1862" b="0" i="0" u="none" strike="noStrike" kern="1200" spc="0" baseline="0">
+                <a:solidFill>
+                  <a:schemeClr val="tx1">
+                    <a:lumMod val="65000"/>
+                    <a:lumOff val="35000"/>
+                  </a:schemeClr>
+                </a:solidFill>
+                <a:latin typeface="+mn-lt"/>
+                <a:ea typeface="+mn-ea"/>
+                <a:cs typeface="+mn-cs"/>
+              </a:defRPr>
+            </a:pPr>
+            <a:r>
+              <a:rPr lang="en-US" altLang="ja-JP" dirty="0" smtClean="0"/>
+              <a:t>Sales</a:t>
+            </a:r>
+            <a:r>
+              <a:rPr lang="ja-JP" altLang="en-US" dirty="0" smtClean="0"/>
+              <a:t>販売</a:t>
+            </a:r>
+            <a:endParaRPr lang="ja-JP" altLang="en-US" dirty="0"/>
+          </a:p>
+        </c:rich>
+      </c:tx>
+      <c:layout/>
+      <c:overlay val="0"/>
+      <c:spPr>
+        <a:noFill/>
+        <a:ln>
+          <a:noFill/>
+        </a:ln>
+        <a:effectLst/>
+      </c:spPr>
+      <c:txPr>
+        <a:bodyPr rot="0" spcFirstLastPara="1" vertOverflow="ellipsis" vert="horz" wrap="square" anchor="ctr" anchorCtr="1"/>
+        <a:lstStyle/>
+        <a:p>
+          <a:pPr>
+            <a:defRPr sz="1862" b="0" i="0" u="none" strike="noStrike" kern="1200" spc="0" baseline="0">
+              <a:solidFill>
+                <a:schemeClr val="tx1">
+                  <a:lumMod val="65000"/>
+                  <a:lumOff val="35000"/>
+                </a:schemeClr>
+              </a:solidFill>
+              <a:latin typeface="+mn-lt"/>
+              <a:ea typeface="+mn-ea"/>
+              <a:cs typeface="+mn-cs"/>
+            </a:defRPr>
+          </a:pPr>
+          <a:endParaRPr lang="ja-JP"/>
+        </a:p>
+      </c:txPr>
+    </c:title>
+    <c:autoTitleDeleted val="0"/>
+    <c:plotArea>
+      <c:layout/>
+      <c:barChart>
+        <c:barDir val="col"/>
+        <c:grouping val="clustered"/>
+        <c:varyColors val="0"/>
+        <c:ser>
+          <c:idx val="0"/>
+          <c:order val="0"/>
+          <c:tx>
+            <c:strRef>
+              <c:f>Sheet1!$B$1</c:f>
+              <c:strCache>
+                <c:ptCount val="1"/>
+                <c:pt idx="0">
+                  <c:v>売り上げ</c:v>
+                </c:pt>
+              </c:strCache>
+            </c:strRef>
+          </c:tx>
+          <c:spPr>
+            <a:solidFill>
+              <a:schemeClr val="accent1"/>
+            </a:solidFill>
+            <a:ln>
+              <a:noFill/>
+            </a:ln>
+            <a:effectLst/>
+          </c:spPr>
+          <c:invertIfNegative val="0"/>
+          <c:cat>
+            <c:strRef>
+              <c:f>Sheet1!$A$2:$A$5</c:f>
+              <c:strCache>
+                <c:ptCount val="4"/>
+                <c:pt idx="0">
+                  <c:v>春</c:v>
+                </c:pt>
+                <c:pt idx="1">
+                  <c:v>夏</c:v>
+                </c:pt>
+                <c:pt idx="2">
+                  <c:v>秋</c:v>
+                </c:pt>
+                <c:pt idx="3">
+                  <c:v>冬</c:v>
+                </c:pt>
+              </c:strCache>
+            </c:strRef>
+          </c:cat>
+          <c:val>
+            <c:numRef>
+              <c:f>Sheet1!$B$2:$B$5</c:f>
+              <c:numCache>
+                <c:formatCode>General</c:formatCode>
+                <c:ptCount val="4"/>
+                <c:pt idx="0">
+                  <c:v>100</c:v>
+                </c:pt>
+                <c:pt idx="1">
+                  <c:v>110</c:v>
+                </c:pt>
+                <c:pt idx="2">
+                  <c:v>120</c:v>
+                </c:pt>
+                <c:pt idx="3">
+                  <c:v>130</c:v>
+                </c:pt>
+              </c:numCache>
+            </c:numRef>
+          </c:val>
+          <c:extLst>
+            <c:ext xmlns:c16="http://schemas.microsoft.com/office/drawing/2014/chart" uri="{C3380CC4-5D6E-409C-BE32-E72D297353CC}">
+              <c16:uniqueId val="{00000000-4E85-4B38-93F8-D581561C12C5}"/>
+            </c:ext>
+          </c:extLst>
+        </c:ser>
+        <c:ser>
+          <c:idx val="1"/>
+          <c:order val="1"/>
+          <c:tx>
+            <c:strRef>
+              <c:f>Sheet1!$C$1</c:f>
+              <c:strCache>
+                <c:ptCount val="1"/>
+                <c:pt idx="0">
+                  <c:v>利益</c:v>
+                </c:pt>
+              </c:strCache>
+            </c:strRef>
+          </c:tx>
+          <c:spPr>
+            <a:solidFill>
+              <a:schemeClr val="accent2"/>
+            </a:solidFill>
+            <a:ln>
+              <a:noFill/>
+            </a:ln>
+            <a:effectLst/>
+          </c:spPr>
+          <c:invertIfNegative val="0"/>
+          <c:cat>
+            <c:strRef>
+              <c:f>Sheet1!$A$2:$A$5</c:f>
+              <c:strCache>
+                <c:ptCount val="4"/>
+                <c:pt idx="0">
+                  <c:v>春</c:v>
+                </c:pt>
+                <c:pt idx="1">
+                  <c:v>夏</c:v>
+                </c:pt>
+                <c:pt idx="2">
+                  <c:v>秋</c:v>
+                </c:pt>
+                <c:pt idx="3">
+                  <c:v>冬</c:v>
+                </c:pt>
+              </c:strCache>
+            </c:strRef>
+          </c:cat>
+          <c:val>
+            <c:numRef>
+              <c:f>Sheet1!$C$2:$C$5</c:f>
+              <c:numCache>
+                <c:formatCode>General</c:formatCode>
+                <c:ptCount val="4"/>
+                <c:pt idx="0">
+                  <c:v>50</c:v>
+                </c:pt>
+                <c:pt idx="1">
+                  <c:v>60</c:v>
+                </c:pt>
+                <c:pt idx="2">
+                  <c:v>70</c:v>
+                </c:pt>
+              </c:numCache>
+            </c:numRef>
+          </c:val>
+          <c:extLst>
+            <c:ext xmlns:c16="http://schemas.microsoft.com/office/drawing/2014/chart" uri="{C3380CC4-5D6E-409C-BE32-E72D297353CC}">
+              <c16:uniqueId val="{00000001-4E85-4B38-93F8-D581561C12C5}"/>
+            </c:ext>
+          </c:extLst>
+        </c:ser>
+        <c:dLbls>
+          <c:showLegendKey val="0"/>
+          <c:showVal val="0"/>
+          <c:showCatName val="0"/>
+          <c:showSerName val="0"/>
+          <c:showPercent val="0"/>
+          <c:showBubbleSize val="0"/>
+        </c:dLbls>
+        <c:gapWidth val="219"/>
+        <c:overlap val="-27"/>
+        <c:axId val="306136656"/>
+        <c:axId val="424804560"/>
+      </c:barChart>
+      <c:lineChart>
+        <c:grouping val="standard"/>
+        <c:varyColors val="0"/>
+        <c:ser>
+          <c:idx val="2"/>
+          <c:order val="2"/>
+          <c:tx>
+            <c:strRef>
+              <c:f>Sheet1!$D$1</c:f>
+              <c:strCache>
+                <c:ptCount val="1"/>
+                <c:pt idx="0">
+                  <c:v>利益率</c:v>
+                </c:pt>
+              </c:strCache>
+            </c:strRef>
+          </c:tx>
+          <c:spPr>
+            <a:ln w="28575" cap="rnd">
+              <a:solidFill>
+                <a:schemeClr val="accent3"/>
+              </a:solidFill>
+              <a:round/>
+            </a:ln>
+            <a:effectLst/>
+          </c:spPr>
+          <c:marker>
+            <c:symbol val="circle"/>
+            <c:size val="5"/>
+            <c:spPr>
+              <a:solidFill>
+                <a:schemeClr val="accent3"/>
+              </a:solidFill>
+              <a:ln w="9525">
+                <a:solidFill>
+                  <a:schemeClr val="accent3"/>
+                </a:solidFill>
+              </a:ln>
+              <a:effectLst/>
+            </c:spPr>
+          </c:marker>
+          <c:cat>
+            <c:strRef>
+              <c:f>Sheet1!$A$2:$A$5</c:f>
+              <c:strCache>
+                <c:ptCount val="4"/>
+                <c:pt idx="0">
+                  <c:v>春</c:v>
+                </c:pt>
+                <c:pt idx="1">
+                  <c:v>夏</c:v>
+                </c:pt>
+                <c:pt idx="2">
+                  <c:v>秋</c:v>
+                </c:pt>
+                <c:pt idx="3">
+                  <c:v>冬</c:v>
+                </c:pt>
+              </c:strCache>
+            </c:strRef>
+          </c:cat>
+          <c:val>
+            <c:numRef>
+              <c:f>Sheet1!$D$2:$D$5</c:f>
+              <c:numCache>
+                <c:formatCode>General</c:formatCode>
+                <c:ptCount val="4"/>
+                <c:pt idx="0">
+                  <c:v>0.5</c:v>
+                </c:pt>
+                <c:pt idx="1">
+                  <c:v>0.5</c:v>
+                </c:pt>
+                <c:pt idx="2">
+                  <c:v>0.5</c:v>
+                </c:pt>
+                <c:pt idx="3">
+                  <c:v>0.6</c:v>
+                </c:pt>
+              </c:numCache>
+            </c:numRef>
+          </c:val>
+          <c:smooth val="0"/>
+          <c:extLst>
+            <c:ext xmlns:c16="http://schemas.microsoft.com/office/drawing/2014/chart" uri="{C3380CC4-5D6E-409C-BE32-E72D297353CC}">
+              <c16:uniqueId val="{00000002-4E85-4B38-93F8-D581561C12C5}"/>
+            </c:ext>
+          </c:extLst>
+        </c:ser>
+        <c:dLbls>
+          <c:showLegendKey val="0"/>
+          <c:showVal val="0"/>
+          <c:showCatName val="0"/>
+          <c:showSerName val="0"/>
+          <c:showPercent val="0"/>
+          <c:showBubbleSize val="0"/>
+        </c:dLbls>
+        <c:marker val="1"/>
+        <c:smooth val="0"/>
+        <c:axId val="308751744"/>
+        <c:axId val="209467696"/>
+      </c:lineChart>
+      <c:catAx>
+        <c:axId val="306136656"/>
+        <c:scaling>
+          <c:orientation val="minMax"/>
+        </c:scaling>
+        <c:delete val="0"/>
+        <c:axPos val="b"/>
+        <c:numFmt formatCode="General" sourceLinked="1"/>
+        <c:majorTickMark val="none"/>
+        <c:minorTickMark val="none"/>
+        <c:tickLblPos val="nextTo"/>
+        <c:spPr>
+          <a:noFill/>
+          <a:ln w="9525" cap="flat" cmpd="sng" algn="ctr">
+            <a:solidFill>
+              <a:schemeClr val="tx1">
+                <a:lumMod val="15000"/>
+                <a:lumOff val="85000"/>
+              </a:schemeClr>
+            </a:solidFill>
+            <a:round/>
+          </a:ln>
+          <a:effectLst/>
+        </c:spPr>
+        <c:txPr>
+          <a:bodyPr rot="-60000000" spcFirstLastPara="1" vertOverflow="ellipsis" vert="horz" wrap="square" anchor="ctr" anchorCtr="1"/>
+          <a:lstStyle/>
+          <a:p>
+            <a:pPr>
+              <a:defRPr sz="1197" b="0" i="0" u="none" strike="noStrike" kern="1200" baseline="0">
+                <a:solidFill>
+                  <a:schemeClr val="tx1">
+                    <a:lumMod val="65000"/>
+                    <a:lumOff val="35000"/>
+                  </a:schemeClr>
+                </a:solidFill>
+                <a:latin typeface="+mn-lt"/>
+                <a:ea typeface="+mn-ea"/>
+                <a:cs typeface="+mn-cs"/>
+              </a:defRPr>
+            </a:pPr>
+            <a:endParaRPr lang="ja-JP"/>
+          </a:p>
+        </c:txPr>
+        <c:crossAx val="424804560"/>
+        <c:crosses val="autoZero"/>
+        <c:auto val="1"/>
+        <c:lblAlgn val="ctr"/>
+        <c:lblOffset val="100"/>
+        <c:noMultiLvlLbl val="0"/>
+      </c:catAx>
+      <c:valAx>
+        <c:axId val="424804560"/>
+        <c:scaling>
+          <c:orientation val="minMax"/>
+          <c:max val="150"/>
+          <c:min val="50"/>
+        </c:scaling>
+        <c:delete val="0"/>
+        <c:axPos val="l"/>
+        <c:majorGridlines>
+          <c:spPr>
+            <a:ln w="9525" cap="flat" cmpd="sng" algn="ctr">
+              <a:solidFill>
+                <a:schemeClr val="tx1">
+                  <a:lumMod val="15000"/>
+                  <a:lumOff val="85000"/>
+                </a:schemeClr>
+              </a:solidFill>
+              <a:round/>
+            </a:ln>
+            <a:effectLst/>
+          </c:spPr>
+        </c:majorGridlines>
+        <c:numFmt formatCode="General" sourceLinked="1"/>
+        <c:majorTickMark val="none"/>
+        <c:minorTickMark val="none"/>
+        <c:tickLblPos val="nextTo"/>
+        <c:spPr>
+          <a:noFill/>
+          <a:ln>
+            <a:noFill/>
+          </a:ln>
+          <a:effectLst/>
+        </c:spPr>
+        <c:txPr>
+          <a:bodyPr rot="-60000000" spcFirstLastPara="1" vertOverflow="ellipsis" vert="horz" wrap="square" anchor="ctr" anchorCtr="1"/>
+          <a:lstStyle/>
+          <a:p>
+            <a:pPr>
+              <a:defRPr sz="1197" b="0" i="0" u="none" strike="noStrike" kern="1200" baseline="0">
+                <a:solidFill>
+                  <a:schemeClr val="tx1">
+                    <a:lumMod val="65000"/>
+                    <a:lumOff val="35000"/>
+                  </a:schemeClr>
+                </a:solidFill>
+                <a:latin typeface="+mn-lt"/>
+                <a:ea typeface="+mn-ea"/>
+                <a:cs typeface="+mn-cs"/>
+              </a:defRPr>
+            </a:pPr>
+            <a:endParaRPr lang="ja-JP"/>
+          </a:p>
+        </c:txPr>
+        <c:crossAx val="306136656"/>
+        <c:crosses val="autoZero"/>
+        <c:crossBetween val="between"/>
+      </c:valAx>
+      <c:valAx>
+        <c:axId val="209467696"/>
+        <c:scaling>
+          <c:orientation val="minMax"/>
+        </c:scaling>
+        <c:delete val="0"/>
+        <c:axPos val="r"/>
+        <c:numFmt formatCode="0%" sourceLinked="0"/>
+        <c:majorTickMark val="out"/>
+        <c:minorTickMark val="none"/>
+        <c:tickLblPos val="nextTo"/>
+        <c:spPr>
+          <a:noFill/>
+          <a:ln>
+            <a:noFill/>
+          </a:ln>
+          <a:effectLst/>
+        </c:spPr>
+        <c:txPr>
+          <a:bodyPr rot="-60000000" spcFirstLastPara="1" vertOverflow="ellipsis" vert="horz" wrap="square" anchor="ctr" anchorCtr="1"/>
+          <a:lstStyle/>
+          <a:p>
+            <a:pPr>
+              <a:defRPr sz="1197" b="0" i="0" u="none" strike="noStrike" kern="1200" baseline="0">
+                <a:solidFill>
+                  <a:schemeClr val="tx1">
+                    <a:lumMod val="65000"/>
+                    <a:lumOff val="35000"/>
+                  </a:schemeClr>
+                </a:solidFill>
+                <a:latin typeface="+mn-lt"/>
+                <a:ea typeface="+mn-ea"/>
+                <a:cs typeface="+mn-cs"/>
+              </a:defRPr>
+            </a:pPr>
+            <a:endParaRPr lang="ja-JP"/>
+          </a:p>
+        </c:txPr>
+        <c:crossAx val="308751744"/>
+        <c:crosses val="max"/>
+        <c:crossBetween val="between"/>
+      </c:valAx>
+      <c:catAx>
+        <c:axId val="308751744"/>
+        <c:scaling>
+          <c:orientation val="minMax"/>
+        </c:scaling>
+        <c:delete val="1"/>
+        <c:axPos val="b"/>
+        <c:numFmt formatCode="General" sourceLinked="1"/>
+        <c:majorTickMark val="out"/>
+        <c:minorTickMark val="none"/>
+        <c:tickLblPos val="nextTo"/>
+        <c:crossAx val="209467696"/>
+        <c:crosses val="autoZero"/>
+        <c:auto val="1"/>
+        <c:lblAlgn val="ctr"/>
+        <c:lblOffset val="100"/>
+        <c:noMultiLvlLbl val="0"/>
+      </c:catAx>
+      <c:spPr>
+        <a:noFill/>
+        <a:ln>
+          <a:noFill/>
+        </a:ln>
+        <a:effectLst/>
+      </c:spPr>
+    </c:plotArea>
+    <c:legend>
+      <c:legendPos val="b"/>
+      <c:layout/>
+      <c:overlay val="0"/>
+      <c:spPr>
+        <a:noFill/>
+        <a:ln>
+          <a:noFill/>
+        </a:ln>
+        <a:effectLst/>
+      </c:spPr>
+      <c:txPr>
+        <a:bodyPr rot="0" spcFirstLastPara="1" vertOverflow="ellipsis" vert="horz" wrap="square" anchor="ctr" anchorCtr="1"/>
+        <a:lstStyle/>
+        <a:p>
+          <a:pPr>
+            <a:defRPr sz="1197" b="0" i="0" u="none" strike="noStrike" kern="1200" baseline="0">
+              <a:solidFill>
+                <a:schemeClr val="tx1">
+                  <a:lumMod val="65000"/>
+                  <a:lumOff val="35000"/>
+                </a:schemeClr>
+              </a:solidFill>
+              <a:latin typeface="+mn-lt"/>
+              <a:ea typeface="+mn-ea"/>
+              <a:cs typeface="+mn-cs"/>
+            </a:defRPr>
+          </a:pPr>
+          <a:endParaRPr lang="ja-JP"/>
+        </a:p>
+      </c:txPr>
+    </c:legend>
+    <c:plotVisOnly val="1"/>
+    <c:dispBlanksAs val="gap"/>
+    <c:showDLblsOverMax val="0"/>
+  </c:chart>
+  <c:spPr>
+    <a:noFill/>
+    <a:ln>
+      <a:noFill/>
+    </a:ln>
+    <a:effectLst/>
+  </c:spPr>
+  <c:txPr>
+    <a:bodyPr/>
+    <a:lstStyle/>
+    <a:p>
+      <a:pPr>
+        <a:defRPr/>
+      </a:pPr>
+      <a:endParaRPr lang="ja-JP"/>
+    </a:p>
+  </c:txPr>
+  <c:externalData r:id="rId3">
+    <c:autoUpdate val="0"/>
+  </c:externalData>
+</c:chartSpace>
+</file>
+
+<file path=ppt/charts/chart3.xml><?xml version="1.0" encoding="utf-8"?>
+<c:chartSpace xmlns:c="http://schemas.openxmlformats.org/drawingml/2006/chart" xmlns:a="http://schemas.openxmlformats.org/drawingml/2006/main" xmlns:r="http://schemas.openxmlformats.org/officeDocument/2006/relationships" xmlns:c16r2="http://schemas.microsoft.com/office/drawing/2015/06/chart">
+  <c:date1904 val="0"/>
+  <c:lang val="ja-JP"/>
+  <c:roundedCorners val="0"/>
+  <mc:AlternateContent xmlns:mc="http://schemas.openxmlformats.org/markup-compatibility/2006">
+    <mc:Choice xmlns:c14="http://schemas.microsoft.com/office/drawing/2007/8/2/chart" Requires="c14">
+      <c14:style val="102"/>
+    </mc:Choice>
+    <mc:Fallback>
+      <c:style val="2"/>
+    </mc:Fallback>
+  </mc:AlternateContent>
+  <c:chart>
+    <c:title>
+      <c:tx>
+        <c:rich>
+          <a:bodyPr rot="0" spcFirstLastPara="1" vertOverflow="ellipsis" vert="horz" wrap="square" anchor="ctr" anchorCtr="1"/>
+          <a:lstStyle/>
+          <a:p>
+            <a:pPr>
+              <a:defRPr sz="1862" b="0" i="0" u="none" strike="noStrike" kern="1200" spc="0" baseline="0">
+                <a:solidFill>
+                  <a:schemeClr val="tx1">
+                    <a:lumMod val="65000"/>
+                    <a:lumOff val="35000"/>
+                  </a:schemeClr>
+                </a:solidFill>
+                <a:latin typeface="+mn-lt"/>
+                <a:ea typeface="+mn-ea"/>
+                <a:cs typeface="+mn-cs"/>
+              </a:defRPr>
+            </a:pPr>
+            <a:r>
+              <a:rPr lang="en-US" altLang="ja-JP" smtClean="0"/>
+              <a:t>{normal2}Sales</a:t>
+            </a:r>
+            <a:r>
+              <a:rPr lang="ja-JP" altLang="en-US" dirty="0" smtClean="0"/>
+              <a:t>販売</a:t>
+            </a:r>
+            <a:endParaRPr lang="ja-JP" altLang="en-US" dirty="0"/>
+          </a:p>
+        </c:rich>
+      </c:tx>
+      <c:layout/>
+      <c:overlay val="0"/>
+      <c:spPr>
+        <a:noFill/>
+        <a:ln>
+          <a:noFill/>
+        </a:ln>
+        <a:effectLst/>
+      </c:spPr>
+      <c:txPr>
+        <a:bodyPr rot="0" spcFirstLastPara="1" vertOverflow="ellipsis" vert="horz" wrap="square" anchor="ctr" anchorCtr="1"/>
+        <a:lstStyle/>
+        <a:p>
+          <a:pPr>
+            <a:defRPr sz="1862" b="0" i="0" u="none" strike="noStrike" kern="1200" spc="0" baseline="0">
+              <a:solidFill>
+                <a:schemeClr val="tx1">
+                  <a:lumMod val="65000"/>
+                  <a:lumOff val="35000"/>
+                </a:schemeClr>
+              </a:solidFill>
+              <a:latin typeface="+mn-lt"/>
+              <a:ea typeface="+mn-ea"/>
+              <a:cs typeface="+mn-cs"/>
+            </a:defRPr>
+          </a:pPr>
+          <a:endParaRPr lang="ja-JP"/>
+        </a:p>
+      </c:txPr>
+    </c:title>
+    <c:autoTitleDeleted val="0"/>
+    <c:plotArea>
+      <c:layout/>
+      <c:barChart>
+        <c:barDir val="col"/>
+        <c:grouping val="clustered"/>
+        <c:varyColors val="0"/>
+        <c:ser>
+          <c:idx val="0"/>
+          <c:order val="0"/>
+          <c:tx>
+            <c:strRef>
+              <c:f>Sheet1!$B$1</c:f>
+              <c:strCache>
+                <c:ptCount val="1"/>
+                <c:pt idx="0">
+                  <c:v>系列 1</c:v>
+                </c:pt>
+              </c:strCache>
+            </c:strRef>
+          </c:tx>
+          <c:spPr>
+            <a:solidFill>
+              <a:schemeClr val="accent1"/>
+            </a:solidFill>
+            <a:ln>
+              <a:noFill/>
+            </a:ln>
+            <a:effectLst/>
+          </c:spPr>
+          <c:invertIfNegative val="0"/>
+          <c:cat>
+            <c:strRef>
+              <c:f>Sheet1!$A$2:$A$5</c:f>
+              <c:strCache>
+                <c:ptCount val="4"/>
+                <c:pt idx="0">
+                  <c:v>分類 1</c:v>
+                </c:pt>
+                <c:pt idx="1">
+                  <c:v>分類 2</c:v>
+                </c:pt>
+                <c:pt idx="2">
+                  <c:v>分類 3</c:v>
+                </c:pt>
+                <c:pt idx="3">
+                  <c:v>分類 4</c:v>
+                </c:pt>
+              </c:strCache>
+            </c:strRef>
+          </c:cat>
+          <c:val>
+            <c:numRef>
+              <c:f>Sheet1!$B$2:$B$5</c:f>
+              <c:numCache>
+                <c:formatCode>General</c:formatCode>
+                <c:ptCount val="4"/>
+                <c:pt idx="0">
+                  <c:v>4.3</c:v>
+                </c:pt>
+                <c:pt idx="1">
+                  <c:v>2.5</c:v>
+                </c:pt>
+                <c:pt idx="2">
+                  <c:v>3.5</c:v>
+                </c:pt>
+                <c:pt idx="3">
+                  <c:v>4.5</c:v>
+                </c:pt>
+              </c:numCache>
+            </c:numRef>
+          </c:val>
+          <c:extLst>
+            <c:ext xmlns:c16="http://schemas.microsoft.com/office/drawing/2014/chart" uri="{C3380CC4-5D6E-409C-BE32-E72D297353CC}">
+              <c16:uniqueId val="{00000000-0326-4CA4-96E1-F416A1964CB4}"/>
+            </c:ext>
+          </c:extLst>
+        </c:ser>
+        <c:ser>
+          <c:idx val="1"/>
+          <c:order val="1"/>
+          <c:tx>
+            <c:strRef>
+              <c:f>Sheet1!$C$1</c:f>
+              <c:strCache>
+                <c:ptCount val="1"/>
+                <c:pt idx="0">
+                  <c:v>系列 2</c:v>
+                </c:pt>
+              </c:strCache>
+            </c:strRef>
+          </c:tx>
+          <c:spPr>
+            <a:solidFill>
+              <a:schemeClr val="accent2"/>
+            </a:solidFill>
+            <a:ln>
+              <a:noFill/>
+            </a:ln>
+            <a:effectLst/>
+          </c:spPr>
+          <c:invertIfNegative val="0"/>
+          <c:cat>
+            <c:strRef>
+              <c:f>Sheet1!$A$2:$A$5</c:f>
+              <c:strCache>
+                <c:ptCount val="4"/>
+                <c:pt idx="0">
+                  <c:v>分類 1</c:v>
+                </c:pt>
+                <c:pt idx="1">
+                  <c:v>分類 2</c:v>
+                </c:pt>
+                <c:pt idx="2">
+                  <c:v>分類 3</c:v>
+                </c:pt>
+                <c:pt idx="3">
+                  <c:v>分類 4</c:v>
+                </c:pt>
+              </c:strCache>
+            </c:strRef>
+          </c:cat>
+          <c:val>
+            <c:numRef>
+              <c:f>Sheet1!$C$2:$C$5</c:f>
+              <c:numCache>
+                <c:formatCode>General</c:formatCode>
+                <c:ptCount val="4"/>
+                <c:pt idx="0">
+                  <c:v>2.4</c:v>
+                </c:pt>
+                <c:pt idx="1">
+                  <c:v>4.4000000000000004</c:v>
+                </c:pt>
+                <c:pt idx="2">
+                  <c:v>1.8</c:v>
+                </c:pt>
+                <c:pt idx="3">
+                  <c:v>2.8</c:v>
+                </c:pt>
+              </c:numCache>
+            </c:numRef>
+          </c:val>
+          <c:extLst>
+            <c:ext xmlns:c16="http://schemas.microsoft.com/office/drawing/2014/chart" uri="{C3380CC4-5D6E-409C-BE32-E72D297353CC}">
+              <c16:uniqueId val="{00000001-0326-4CA4-96E1-F416A1964CB4}"/>
+            </c:ext>
+          </c:extLst>
+        </c:ser>
+        <c:dLbls>
+          <c:showLegendKey val="0"/>
+          <c:showVal val="0"/>
+          <c:showCatName val="0"/>
+          <c:showSerName val="0"/>
+          <c:showPercent val="0"/>
+          <c:showBubbleSize val="0"/>
+        </c:dLbls>
+        <c:gapWidth val="219"/>
+        <c:overlap val="-27"/>
+        <c:axId val="306136656"/>
+        <c:axId val="424804560"/>
+      </c:barChart>
+      <c:lineChart>
+        <c:grouping val="standard"/>
+        <c:varyColors val="0"/>
+        <c:ser>
+          <c:idx val="2"/>
+          <c:order val="2"/>
+          <c:tx>
+            <c:strRef>
+              <c:f>Sheet1!$D$1</c:f>
+              <c:strCache>
+                <c:ptCount val="1"/>
+                <c:pt idx="0">
+                  <c:v>系列 3</c:v>
+                </c:pt>
+              </c:strCache>
+            </c:strRef>
+          </c:tx>
+          <c:spPr>
+            <a:ln w="28575" cap="rnd">
+              <a:solidFill>
+                <a:schemeClr val="accent3"/>
+              </a:solidFill>
+              <a:round/>
+            </a:ln>
+            <a:effectLst/>
+          </c:spPr>
+          <c:marker>
+            <c:symbol val="circle"/>
+            <c:size val="5"/>
+            <c:spPr>
+              <a:solidFill>
+                <a:schemeClr val="accent3"/>
+              </a:solidFill>
+              <a:ln w="9525">
+                <a:solidFill>
+                  <a:schemeClr val="accent3"/>
+                </a:solidFill>
+              </a:ln>
+              <a:effectLst/>
+            </c:spPr>
+          </c:marker>
+          <c:cat>
+            <c:strRef>
+              <c:f>Sheet1!$A$2:$A$5</c:f>
+              <c:strCache>
+                <c:ptCount val="4"/>
+                <c:pt idx="0">
+                  <c:v>分類 1</c:v>
+                </c:pt>
+                <c:pt idx="1">
+                  <c:v>分類 2</c:v>
+                </c:pt>
+                <c:pt idx="2">
+                  <c:v>分類 3</c:v>
+                </c:pt>
+                <c:pt idx="3">
+                  <c:v>分類 4</c:v>
+                </c:pt>
+              </c:strCache>
+            </c:strRef>
+          </c:cat>
+          <c:val>
+            <c:numRef>
+              <c:f>Sheet1!$D$2:$D$5</c:f>
+              <c:numCache>
+                <c:formatCode>General</c:formatCode>
+                <c:ptCount val="4"/>
+                <c:pt idx="0">
+                  <c:v>2</c:v>
+                </c:pt>
+                <c:pt idx="1">
+                  <c:v>2</c:v>
+                </c:pt>
+                <c:pt idx="2">
+                  <c:v>3</c:v>
+                </c:pt>
+                <c:pt idx="3">
+                  <c:v>5</c:v>
+                </c:pt>
+              </c:numCache>
+            </c:numRef>
+          </c:val>
+          <c:smooth val="0"/>
+          <c:extLst>
+            <c:ext xmlns:c16="http://schemas.microsoft.com/office/drawing/2014/chart" uri="{C3380CC4-5D6E-409C-BE32-E72D297353CC}">
+              <c16:uniqueId val="{00000002-0326-4CA4-96E1-F416A1964CB4}"/>
+            </c:ext>
+          </c:extLst>
+        </c:ser>
+        <c:dLbls>
+          <c:showLegendKey val="0"/>
+          <c:showVal val="0"/>
+          <c:showCatName val="0"/>
+          <c:showSerName val="0"/>
+          <c:showPercent val="0"/>
+          <c:showBubbleSize val="0"/>
+        </c:dLbls>
+        <c:marker val="1"/>
+        <c:smooth val="0"/>
+        <c:axId val="308281872"/>
+        <c:axId val="209466448"/>
+      </c:lineChart>
+      <c:catAx>
+        <c:axId val="306136656"/>
+        <c:scaling>
+          <c:orientation val="minMax"/>
+        </c:scaling>
+        <c:delete val="0"/>
+        <c:axPos val="b"/>
+        <c:numFmt formatCode="General" sourceLinked="1"/>
+        <c:majorTickMark val="none"/>
+        <c:minorTickMark val="none"/>
+        <c:tickLblPos val="nextTo"/>
+        <c:spPr>
+          <a:noFill/>
+          <a:ln w="9525" cap="flat" cmpd="sng" algn="ctr">
+            <a:solidFill>
+              <a:schemeClr val="tx1">
+                <a:lumMod val="15000"/>
+                <a:lumOff val="85000"/>
+              </a:schemeClr>
+            </a:solidFill>
+            <a:round/>
+          </a:ln>
+          <a:effectLst/>
+        </c:spPr>
+        <c:txPr>
+          <a:bodyPr rot="-60000000" spcFirstLastPara="1" vertOverflow="ellipsis" vert="horz" wrap="square" anchor="ctr" anchorCtr="1"/>
+          <a:lstStyle/>
+          <a:p>
+            <a:pPr>
+              <a:defRPr sz="1197" b="0" i="0" u="none" strike="noStrike" kern="1200" baseline="0">
+                <a:solidFill>
+                  <a:schemeClr val="tx1">
+                    <a:lumMod val="65000"/>
+                    <a:lumOff val="35000"/>
+                  </a:schemeClr>
+                </a:solidFill>
+                <a:latin typeface="+mn-lt"/>
+                <a:ea typeface="+mn-ea"/>
+                <a:cs typeface="+mn-cs"/>
+              </a:defRPr>
+            </a:pPr>
+            <a:endParaRPr lang="ja-JP"/>
+          </a:p>
+        </c:txPr>
+        <c:crossAx val="424804560"/>
+        <c:crosses val="autoZero"/>
+        <c:auto val="1"/>
+        <c:lblAlgn val="ctr"/>
+        <c:lblOffset val="100"/>
+        <c:noMultiLvlLbl val="0"/>
+      </c:catAx>
+      <c:valAx>
+        <c:axId val="424804560"/>
+        <c:scaling>
+          <c:orientation val="minMax"/>
+        </c:scaling>
+        <c:delete val="0"/>
+        <c:axPos val="l"/>
+        <c:majorGridlines>
+          <c:spPr>
+            <a:ln w="9525" cap="flat" cmpd="sng" algn="ctr">
+              <a:solidFill>
+                <a:schemeClr val="tx1">
+                  <a:lumMod val="15000"/>
+                  <a:lumOff val="85000"/>
+                </a:schemeClr>
+              </a:solidFill>
+              <a:round/>
+            </a:ln>
+            <a:effectLst/>
+          </c:spPr>
+        </c:majorGridlines>
+        <c:numFmt formatCode="General" sourceLinked="1"/>
+        <c:majorTickMark val="none"/>
+        <c:minorTickMark val="none"/>
+        <c:tickLblPos val="nextTo"/>
+        <c:spPr>
+          <a:noFill/>
+          <a:ln>
+            <a:noFill/>
+          </a:ln>
+          <a:effectLst/>
+        </c:spPr>
+        <c:txPr>
+          <a:bodyPr rot="-60000000" spcFirstLastPara="1" vertOverflow="ellipsis" vert="horz" wrap="square" anchor="ctr" anchorCtr="1"/>
+          <a:lstStyle/>
+          <a:p>
+            <a:pPr>
+              <a:defRPr sz="1197" b="0" i="0" u="none" strike="noStrike" kern="1200" baseline="0">
+                <a:solidFill>
+                  <a:schemeClr val="tx1">
+                    <a:lumMod val="65000"/>
+                    <a:lumOff val="35000"/>
+                  </a:schemeClr>
+                </a:solidFill>
+                <a:latin typeface="+mn-lt"/>
+                <a:ea typeface="+mn-ea"/>
+                <a:cs typeface="+mn-cs"/>
+              </a:defRPr>
+            </a:pPr>
+            <a:endParaRPr lang="ja-JP"/>
+          </a:p>
+        </c:txPr>
+        <c:crossAx val="306136656"/>
+        <c:crosses val="autoZero"/>
+        <c:crossBetween val="between"/>
+      </c:valAx>
+      <c:valAx>
+        <c:axId val="209466448"/>
+        <c:scaling>
+          <c:orientation val="minMax"/>
+        </c:scaling>
+        <c:delete val="0"/>
+        <c:axPos val="r"/>
+        <c:numFmt formatCode="0%" sourceLinked="0"/>
+        <c:majorTickMark val="out"/>
+        <c:minorTickMark val="none"/>
+        <c:tickLblPos val="nextTo"/>
+        <c:spPr>
+          <a:noFill/>
+          <a:ln>
+            <a:noFill/>
+          </a:ln>
+          <a:effectLst/>
+        </c:spPr>
+        <c:txPr>
+          <a:bodyPr rot="-60000000" spcFirstLastPara="1" vertOverflow="ellipsis" vert="horz" wrap="square" anchor="ctr" anchorCtr="1"/>
+          <a:lstStyle/>
+          <a:p>
+            <a:pPr>
+              <a:defRPr sz="1197" b="0" i="0" u="none" strike="noStrike" kern="1200" baseline="0">
+                <a:solidFill>
+                  <a:schemeClr val="tx1">
+                    <a:lumMod val="65000"/>
+                    <a:lumOff val="35000"/>
+                  </a:schemeClr>
+                </a:solidFill>
+                <a:latin typeface="+mn-lt"/>
+                <a:ea typeface="+mn-ea"/>
+                <a:cs typeface="+mn-cs"/>
+              </a:defRPr>
+            </a:pPr>
+            <a:endParaRPr lang="ja-JP"/>
+          </a:p>
+        </c:txPr>
+        <c:crossAx val="308281872"/>
+        <c:crosses val="max"/>
+        <c:crossBetween val="between"/>
+      </c:valAx>
+      <c:catAx>
+        <c:axId val="308281872"/>
+        <c:scaling>
+          <c:orientation val="minMax"/>
+        </c:scaling>
+        <c:delete val="1"/>
+        <c:axPos val="b"/>
+        <c:numFmt formatCode="General" sourceLinked="1"/>
+        <c:majorTickMark val="out"/>
+        <c:minorTickMark val="none"/>
+        <c:tickLblPos val="nextTo"/>
+        <c:crossAx val="209466448"/>
+        <c:crosses val="autoZero"/>
+        <c:auto val="1"/>
+        <c:lblAlgn val="ctr"/>
+        <c:lblOffset val="100"/>
+        <c:noMultiLvlLbl val="0"/>
+      </c:catAx>
+      <c:spPr>
+        <a:noFill/>
+        <a:ln>
+          <a:noFill/>
+        </a:ln>
+        <a:effectLst/>
+      </c:spPr>
+    </c:plotArea>
+    <c:legend>
+      <c:legendPos val="b"/>
+      <c:layout/>
+      <c:overlay val="0"/>
+      <c:spPr>
+        <a:noFill/>
+        <a:ln>
+          <a:noFill/>
+        </a:ln>
+        <a:effectLst/>
+      </c:spPr>
+      <c:txPr>
+        <a:bodyPr rot="0" spcFirstLastPara="1" vertOverflow="ellipsis" vert="horz" wrap="square" anchor="ctr" anchorCtr="1"/>
+        <a:lstStyle/>
+        <a:p>
+          <a:pPr>
+            <a:defRPr sz="1197" b="0" i="0" u="none" strike="noStrike" kern="1200" baseline="0">
+              <a:solidFill>
+                <a:schemeClr val="tx1">
+                  <a:lumMod val="65000"/>
+                  <a:lumOff val="35000"/>
+                </a:schemeClr>
+              </a:solidFill>
+              <a:latin typeface="+mn-lt"/>
+              <a:ea typeface="+mn-ea"/>
+              <a:cs typeface="+mn-cs"/>
+            </a:defRPr>
+          </a:pPr>
+          <a:endParaRPr lang="ja-JP"/>
+        </a:p>
+      </c:txPr>
+    </c:legend>
+    <c:plotVisOnly val="1"/>
+    <c:dispBlanksAs val="gap"/>
+    <c:showDLblsOverMax val="0"/>
+  </c:chart>
+  <c:spPr>
+    <a:noFill/>
+    <a:ln>
+      <a:noFill/>
+    </a:ln>
+    <a:effectLst/>
+  </c:spPr>
+  <c:txPr>
+    <a:bodyPr/>
+    <a:lstStyle/>
+    <a:p>
+      <a:pPr>
+        <a:defRPr/>
+      </a:pPr>
+      <a:endParaRPr lang="ja-JP"/>
+    </a:p>
+  </c:txPr>
+  <c:externalData r:id="rId3">
+    <c:autoUpdate val="0"/>
+  </c:externalData>
+</c:chartSpace>
+</file>
+
+<file path=ppt/charts/chart4.xml><?xml version="1.0" encoding="utf-8"?>
 <c:chartSpace xmlns:c="http://schemas.openxmlformats.org/drawingml/2006/chart" xmlns:a="http://schemas.openxmlformats.org/drawingml/2006/main" xmlns:r="http://schemas.openxmlformats.org/officeDocument/2006/relationships" xmlns:c16r2="http://schemas.microsoft.com/office/drawing/2015/06/chart">
   <c:date1904 val="0"/>
   <c:lang val="ja-JP"/>
@@ -1338,6 +2483,86 @@
 </cs:colorStyle>
 </file>
 
+<file path=ppt/charts/colors3.xml><?xml version="1.0" encoding="utf-8"?>
+<cs:colorStyle xmlns:cs="http://schemas.microsoft.com/office/drawing/2012/chartStyle" xmlns:a="http://schemas.openxmlformats.org/drawingml/2006/main" meth="cycle" id="10">
+  <a:schemeClr val="accent1"/>
+  <a:schemeClr val="accent2"/>
+  <a:schemeClr val="accent3"/>
+  <a:schemeClr val="accent4"/>
+  <a:schemeClr val="accent5"/>
+  <a:schemeClr val="accent6"/>
+  <cs:variation/>
+  <cs:variation>
+    <a:lumMod val="60000"/>
+  </cs:variation>
+  <cs:variation>
+    <a:lumMod val="80000"/>
+    <a:lumOff val="20000"/>
+  </cs:variation>
+  <cs:variation>
+    <a:lumMod val="80000"/>
+  </cs:variation>
+  <cs:variation>
+    <a:lumMod val="60000"/>
+    <a:lumOff val="40000"/>
+  </cs:variation>
+  <cs:variation>
+    <a:lumMod val="50000"/>
+  </cs:variation>
+  <cs:variation>
+    <a:lumMod val="70000"/>
+    <a:lumOff val="30000"/>
+  </cs:variation>
+  <cs:variation>
+    <a:lumMod val="70000"/>
+  </cs:variation>
+  <cs:variation>
+    <a:lumMod val="50000"/>
+    <a:lumOff val="50000"/>
+  </cs:variation>
+</cs:colorStyle>
+</file>
+
+<file path=ppt/charts/colors4.xml><?xml version="1.0" encoding="utf-8"?>
+<cs:colorStyle xmlns:cs="http://schemas.microsoft.com/office/drawing/2012/chartStyle" xmlns:a="http://schemas.openxmlformats.org/drawingml/2006/main" meth="cycle" id="10">
+  <a:schemeClr val="accent1"/>
+  <a:schemeClr val="accent2"/>
+  <a:schemeClr val="accent3"/>
+  <a:schemeClr val="accent4"/>
+  <a:schemeClr val="accent5"/>
+  <a:schemeClr val="accent6"/>
+  <cs:variation/>
+  <cs:variation>
+    <a:lumMod val="60000"/>
+  </cs:variation>
+  <cs:variation>
+    <a:lumMod val="80000"/>
+    <a:lumOff val="20000"/>
+  </cs:variation>
+  <cs:variation>
+    <a:lumMod val="80000"/>
+  </cs:variation>
+  <cs:variation>
+    <a:lumMod val="60000"/>
+    <a:lumOff val="40000"/>
+  </cs:variation>
+  <cs:variation>
+    <a:lumMod val="50000"/>
+  </cs:variation>
+  <cs:variation>
+    <a:lumMod val="70000"/>
+    <a:lumOff val="30000"/>
+  </cs:variation>
+  <cs:variation>
+    <a:lumMod val="70000"/>
+  </cs:variation>
+  <cs:variation>
+    <a:lumMod val="50000"/>
+    <a:lumOff val="50000"/>
+  </cs:variation>
+</cs:colorStyle>
+</file>
+
 <file path=ppt/charts/style1.xml><?xml version="1.0" encoding="utf-8"?>
 <cs:chartStyle xmlns:cs="http://schemas.microsoft.com/office/drawing/2012/chartStyle" xmlns:a="http://schemas.openxmlformats.org/drawingml/2006/main" id="201">
   <cs:axisTitle>
@@ -1842,6 +3067,1012 @@
 </file>
 
 <file path=ppt/charts/style2.xml><?xml version="1.0" encoding="utf-8"?>
+<cs:chartStyle xmlns:cs="http://schemas.microsoft.com/office/drawing/2012/chartStyle" xmlns:a="http://schemas.openxmlformats.org/drawingml/2006/main" id="201">
+  <cs:axisTitle>
+    <cs:lnRef idx="0"/>
+    <cs:fillRef idx="0"/>
+    <cs:effectRef idx="0"/>
+    <cs:fontRef idx="minor">
+      <a:schemeClr val="tx1">
+        <a:lumMod val="65000"/>
+        <a:lumOff val="35000"/>
+      </a:schemeClr>
+    </cs:fontRef>
+    <cs:defRPr sz="1330" kern="1200"/>
+  </cs:axisTitle>
+  <cs:categoryAxis>
+    <cs:lnRef idx="0"/>
+    <cs:fillRef idx="0"/>
+    <cs:effectRef idx="0"/>
+    <cs:fontRef idx="minor">
+      <a:schemeClr val="tx1">
+        <a:lumMod val="65000"/>
+        <a:lumOff val="35000"/>
+      </a:schemeClr>
+    </cs:fontRef>
+    <cs:spPr>
+      <a:ln w="9525" cap="flat" cmpd="sng" algn="ctr">
+        <a:solidFill>
+          <a:schemeClr val="tx1">
+            <a:lumMod val="15000"/>
+            <a:lumOff val="85000"/>
+          </a:schemeClr>
+        </a:solidFill>
+        <a:round/>
+      </a:ln>
+    </cs:spPr>
+    <cs:defRPr sz="1197" kern="1200"/>
+  </cs:categoryAxis>
+  <cs:chartArea mods="allowNoFillOverride allowNoLineOverride">
+    <cs:lnRef idx="0"/>
+    <cs:fillRef idx="0"/>
+    <cs:effectRef idx="0"/>
+    <cs:fontRef idx="minor">
+      <a:schemeClr val="tx1"/>
+    </cs:fontRef>
+    <cs:spPr>
+      <a:solidFill>
+        <a:schemeClr val="bg1"/>
+      </a:solidFill>
+      <a:ln w="9525" cap="flat" cmpd="sng" algn="ctr">
+        <a:solidFill>
+          <a:schemeClr val="tx1">
+            <a:lumMod val="15000"/>
+            <a:lumOff val="85000"/>
+          </a:schemeClr>
+        </a:solidFill>
+        <a:round/>
+      </a:ln>
+    </cs:spPr>
+    <cs:defRPr sz="1330" kern="1200"/>
+  </cs:chartArea>
+  <cs:dataLabel>
+    <cs:lnRef idx="0"/>
+    <cs:fillRef idx="0"/>
+    <cs:effectRef idx="0"/>
+    <cs:fontRef idx="minor">
+      <a:schemeClr val="tx1">
+        <a:lumMod val="75000"/>
+        <a:lumOff val="25000"/>
+      </a:schemeClr>
+    </cs:fontRef>
+    <cs:defRPr sz="1197" kern="1200"/>
+  </cs:dataLabel>
+  <cs:dataLabelCallout>
+    <cs:lnRef idx="0"/>
+    <cs:fillRef idx="0"/>
+    <cs:effectRef idx="0"/>
+    <cs:fontRef idx="minor">
+      <a:schemeClr val="dk1">
+        <a:lumMod val="65000"/>
+        <a:lumOff val="35000"/>
+      </a:schemeClr>
+    </cs:fontRef>
+    <cs:spPr>
+      <a:solidFill>
+        <a:schemeClr val="lt1"/>
+      </a:solidFill>
+      <a:ln>
+        <a:solidFill>
+          <a:schemeClr val="dk1">
+            <a:lumMod val="25000"/>
+            <a:lumOff val="75000"/>
+          </a:schemeClr>
+        </a:solidFill>
+      </a:ln>
+    </cs:spPr>
+    <cs:defRPr sz="1197" kern="1200"/>
+    <cs:bodyPr rot="0" spcFirstLastPara="1" vertOverflow="clip" horzOverflow="clip" vert="horz" wrap="square" lIns="36576" tIns="18288" rIns="36576" bIns="18288" anchor="ctr" anchorCtr="1">
+      <a:spAutoFit/>
+    </cs:bodyPr>
+  </cs:dataLabelCallout>
+  <cs:dataPoint>
+    <cs:lnRef idx="0"/>
+    <cs:fillRef idx="1">
+      <cs:styleClr val="auto"/>
+    </cs:fillRef>
+    <cs:effectRef idx="0"/>
+    <cs:fontRef idx="minor">
+      <a:schemeClr val="tx1"/>
+    </cs:fontRef>
+  </cs:dataPoint>
+  <cs:dataPoint3D>
+    <cs:lnRef idx="0"/>
+    <cs:fillRef idx="1">
+      <cs:styleClr val="auto"/>
+    </cs:fillRef>
+    <cs:effectRef idx="0"/>
+    <cs:fontRef idx="minor">
+      <a:schemeClr val="tx1"/>
+    </cs:fontRef>
+  </cs:dataPoint3D>
+  <cs:dataPointLine>
+    <cs:lnRef idx="0">
+      <cs:styleClr val="auto"/>
+    </cs:lnRef>
+    <cs:fillRef idx="1"/>
+    <cs:effectRef idx="0"/>
+    <cs:fontRef idx="minor">
+      <a:schemeClr val="tx1"/>
+    </cs:fontRef>
+    <cs:spPr>
+      <a:ln w="28575" cap="rnd">
+        <a:solidFill>
+          <a:schemeClr val="phClr"/>
+        </a:solidFill>
+        <a:round/>
+      </a:ln>
+    </cs:spPr>
+  </cs:dataPointLine>
+  <cs:dataPointMarker>
+    <cs:lnRef idx="0">
+      <cs:styleClr val="auto"/>
+    </cs:lnRef>
+    <cs:fillRef idx="1">
+      <cs:styleClr val="auto"/>
+    </cs:fillRef>
+    <cs:effectRef idx="0"/>
+    <cs:fontRef idx="minor">
+      <a:schemeClr val="tx1"/>
+    </cs:fontRef>
+    <cs:spPr>
+      <a:ln w="9525">
+        <a:solidFill>
+          <a:schemeClr val="phClr"/>
+        </a:solidFill>
+      </a:ln>
+    </cs:spPr>
+  </cs:dataPointMarker>
+  <cs:dataPointMarkerLayout symbol="circle" size="5"/>
+  <cs:dataPointWireframe>
+    <cs:lnRef idx="0">
+      <cs:styleClr val="auto"/>
+    </cs:lnRef>
+    <cs:fillRef idx="1"/>
+    <cs:effectRef idx="0"/>
+    <cs:fontRef idx="minor">
+      <a:schemeClr val="tx1"/>
+    </cs:fontRef>
+    <cs:spPr>
+      <a:ln w="9525" cap="rnd">
+        <a:solidFill>
+          <a:schemeClr val="phClr"/>
+        </a:solidFill>
+        <a:round/>
+      </a:ln>
+    </cs:spPr>
+  </cs:dataPointWireframe>
+  <cs:dataTable>
+    <cs:lnRef idx="0"/>
+    <cs:fillRef idx="0"/>
+    <cs:effectRef idx="0"/>
+    <cs:fontRef idx="minor">
+      <a:schemeClr val="tx1">
+        <a:lumMod val="65000"/>
+        <a:lumOff val="35000"/>
+      </a:schemeClr>
+    </cs:fontRef>
+    <cs:spPr>
+      <a:noFill/>
+      <a:ln w="9525" cap="flat" cmpd="sng" algn="ctr">
+        <a:solidFill>
+          <a:schemeClr val="tx1">
+            <a:lumMod val="15000"/>
+            <a:lumOff val="85000"/>
+          </a:schemeClr>
+        </a:solidFill>
+        <a:round/>
+      </a:ln>
+    </cs:spPr>
+    <cs:defRPr sz="1197" kern="1200"/>
+  </cs:dataTable>
+  <cs:downBar>
+    <cs:lnRef idx="0"/>
+    <cs:fillRef idx="0"/>
+    <cs:effectRef idx="0"/>
+    <cs:fontRef idx="minor">
+      <a:schemeClr val="dk1"/>
+    </cs:fontRef>
+    <cs:spPr>
+      <a:solidFill>
+        <a:schemeClr val="dk1">
+          <a:lumMod val="65000"/>
+          <a:lumOff val="35000"/>
+        </a:schemeClr>
+      </a:solidFill>
+      <a:ln w="9525">
+        <a:solidFill>
+          <a:schemeClr val="tx1">
+            <a:lumMod val="65000"/>
+            <a:lumOff val="35000"/>
+          </a:schemeClr>
+        </a:solidFill>
+      </a:ln>
+    </cs:spPr>
+  </cs:downBar>
+  <cs:dropLine>
+    <cs:lnRef idx="0"/>
+    <cs:fillRef idx="0"/>
+    <cs:effectRef idx="0"/>
+    <cs:fontRef idx="minor">
+      <a:schemeClr val="tx1"/>
+    </cs:fontRef>
+    <cs:spPr>
+      <a:ln w="9525" cap="flat" cmpd="sng" algn="ctr">
+        <a:solidFill>
+          <a:schemeClr val="tx1">
+            <a:lumMod val="35000"/>
+            <a:lumOff val="65000"/>
+          </a:schemeClr>
+        </a:solidFill>
+        <a:round/>
+      </a:ln>
+    </cs:spPr>
+  </cs:dropLine>
+  <cs:errorBar>
+    <cs:lnRef idx="0"/>
+    <cs:fillRef idx="0"/>
+    <cs:effectRef idx="0"/>
+    <cs:fontRef idx="minor">
+      <a:schemeClr val="tx1"/>
+    </cs:fontRef>
+    <cs:spPr>
+      <a:ln w="9525" cap="flat" cmpd="sng" algn="ctr">
+        <a:solidFill>
+          <a:schemeClr val="tx1">
+            <a:lumMod val="65000"/>
+            <a:lumOff val="35000"/>
+          </a:schemeClr>
+        </a:solidFill>
+        <a:round/>
+      </a:ln>
+    </cs:spPr>
+  </cs:errorBar>
+  <cs:floor>
+    <cs:lnRef idx="0"/>
+    <cs:fillRef idx="0"/>
+    <cs:effectRef idx="0"/>
+    <cs:fontRef idx="minor">
+      <a:schemeClr val="tx1"/>
+    </cs:fontRef>
+    <cs:spPr>
+      <a:noFill/>
+      <a:ln>
+        <a:noFill/>
+      </a:ln>
+    </cs:spPr>
+  </cs:floor>
+  <cs:gridlineMajor>
+    <cs:lnRef idx="0"/>
+    <cs:fillRef idx="0"/>
+    <cs:effectRef idx="0"/>
+    <cs:fontRef idx="minor">
+      <a:schemeClr val="tx1"/>
+    </cs:fontRef>
+    <cs:spPr>
+      <a:ln w="9525" cap="flat" cmpd="sng" algn="ctr">
+        <a:solidFill>
+          <a:schemeClr val="tx1">
+            <a:lumMod val="15000"/>
+            <a:lumOff val="85000"/>
+          </a:schemeClr>
+        </a:solidFill>
+        <a:round/>
+      </a:ln>
+    </cs:spPr>
+  </cs:gridlineMajor>
+  <cs:gridlineMinor>
+    <cs:lnRef idx="0"/>
+    <cs:fillRef idx="0"/>
+    <cs:effectRef idx="0"/>
+    <cs:fontRef idx="minor">
+      <a:schemeClr val="tx1"/>
+    </cs:fontRef>
+    <cs:spPr>
+      <a:ln w="9525" cap="flat" cmpd="sng" algn="ctr">
+        <a:solidFill>
+          <a:schemeClr val="tx1">
+            <a:lumMod val="5000"/>
+            <a:lumOff val="95000"/>
+          </a:schemeClr>
+        </a:solidFill>
+        <a:round/>
+      </a:ln>
+    </cs:spPr>
+  </cs:gridlineMinor>
+  <cs:hiLoLine>
+    <cs:lnRef idx="0"/>
+    <cs:fillRef idx="0"/>
+    <cs:effectRef idx="0"/>
+    <cs:fontRef idx="minor">
+      <a:schemeClr val="tx1"/>
+    </cs:fontRef>
+    <cs:spPr>
+      <a:ln w="9525" cap="flat" cmpd="sng" algn="ctr">
+        <a:solidFill>
+          <a:schemeClr val="tx1">
+            <a:lumMod val="75000"/>
+            <a:lumOff val="25000"/>
+          </a:schemeClr>
+        </a:solidFill>
+        <a:round/>
+      </a:ln>
+    </cs:spPr>
+  </cs:hiLoLine>
+  <cs:leaderLine>
+    <cs:lnRef idx="0"/>
+    <cs:fillRef idx="0"/>
+    <cs:effectRef idx="0"/>
+    <cs:fontRef idx="minor">
+      <a:schemeClr val="tx1"/>
+    </cs:fontRef>
+    <cs:spPr>
+      <a:ln w="9525" cap="flat" cmpd="sng" algn="ctr">
+        <a:solidFill>
+          <a:schemeClr val="tx1">
+            <a:lumMod val="35000"/>
+            <a:lumOff val="65000"/>
+          </a:schemeClr>
+        </a:solidFill>
+        <a:round/>
+      </a:ln>
+    </cs:spPr>
+  </cs:leaderLine>
+  <cs:legend>
+    <cs:lnRef idx="0"/>
+    <cs:fillRef idx="0"/>
+    <cs:effectRef idx="0"/>
+    <cs:fontRef idx="minor">
+      <a:schemeClr val="tx1">
+        <a:lumMod val="65000"/>
+        <a:lumOff val="35000"/>
+      </a:schemeClr>
+    </cs:fontRef>
+    <cs:defRPr sz="1197" kern="1200"/>
+  </cs:legend>
+  <cs:plotArea mods="allowNoFillOverride allowNoLineOverride">
+    <cs:lnRef idx="0"/>
+    <cs:fillRef idx="0"/>
+    <cs:effectRef idx="0"/>
+    <cs:fontRef idx="minor">
+      <a:schemeClr val="tx1"/>
+    </cs:fontRef>
+  </cs:plotArea>
+  <cs:plotArea3D mods="allowNoFillOverride allowNoLineOverride">
+    <cs:lnRef idx="0"/>
+    <cs:fillRef idx="0"/>
+    <cs:effectRef idx="0"/>
+    <cs:fontRef idx="minor">
+      <a:schemeClr val="tx1"/>
+    </cs:fontRef>
+  </cs:plotArea3D>
+  <cs:seriesAxis>
+    <cs:lnRef idx="0"/>
+    <cs:fillRef idx="0"/>
+    <cs:effectRef idx="0"/>
+    <cs:fontRef idx="minor">
+      <a:schemeClr val="tx1">
+        <a:lumMod val="65000"/>
+        <a:lumOff val="35000"/>
+      </a:schemeClr>
+    </cs:fontRef>
+    <cs:defRPr sz="1197" kern="1200"/>
+  </cs:seriesAxis>
+  <cs:seriesLine>
+    <cs:lnRef idx="0"/>
+    <cs:fillRef idx="0"/>
+    <cs:effectRef idx="0"/>
+    <cs:fontRef idx="minor">
+      <a:schemeClr val="tx1"/>
+    </cs:fontRef>
+    <cs:spPr>
+      <a:ln w="9525" cap="flat" cmpd="sng" algn="ctr">
+        <a:solidFill>
+          <a:schemeClr val="tx1">
+            <a:lumMod val="35000"/>
+            <a:lumOff val="65000"/>
+          </a:schemeClr>
+        </a:solidFill>
+        <a:round/>
+      </a:ln>
+    </cs:spPr>
+  </cs:seriesLine>
+  <cs:title>
+    <cs:lnRef idx="0"/>
+    <cs:fillRef idx="0"/>
+    <cs:effectRef idx="0"/>
+    <cs:fontRef idx="minor">
+      <a:schemeClr val="tx1">
+        <a:lumMod val="65000"/>
+        <a:lumOff val="35000"/>
+      </a:schemeClr>
+    </cs:fontRef>
+    <cs:defRPr sz="1862" b="0" kern="1200" spc="0" baseline="0"/>
+  </cs:title>
+  <cs:trendline>
+    <cs:lnRef idx="0">
+      <cs:styleClr val="auto"/>
+    </cs:lnRef>
+    <cs:fillRef idx="0"/>
+    <cs:effectRef idx="0"/>
+    <cs:fontRef idx="minor">
+      <a:schemeClr val="tx1"/>
+    </cs:fontRef>
+    <cs:spPr>
+      <a:ln w="19050" cap="rnd">
+        <a:solidFill>
+          <a:schemeClr val="phClr"/>
+        </a:solidFill>
+        <a:prstDash val="sysDot"/>
+      </a:ln>
+    </cs:spPr>
+  </cs:trendline>
+  <cs:trendlineLabel>
+    <cs:lnRef idx="0"/>
+    <cs:fillRef idx="0"/>
+    <cs:effectRef idx="0"/>
+    <cs:fontRef idx="minor">
+      <a:schemeClr val="tx1">
+        <a:lumMod val="65000"/>
+        <a:lumOff val="35000"/>
+      </a:schemeClr>
+    </cs:fontRef>
+    <cs:defRPr sz="1197" kern="1200"/>
+  </cs:trendlineLabel>
+  <cs:upBar>
+    <cs:lnRef idx="0"/>
+    <cs:fillRef idx="0"/>
+    <cs:effectRef idx="0"/>
+    <cs:fontRef idx="minor">
+      <a:schemeClr val="dk1"/>
+    </cs:fontRef>
+    <cs:spPr>
+      <a:solidFill>
+        <a:schemeClr val="lt1"/>
+      </a:solidFill>
+      <a:ln w="9525">
+        <a:solidFill>
+          <a:schemeClr val="tx1">
+            <a:lumMod val="15000"/>
+            <a:lumOff val="85000"/>
+          </a:schemeClr>
+        </a:solidFill>
+      </a:ln>
+    </cs:spPr>
+  </cs:upBar>
+  <cs:valueAxis>
+    <cs:lnRef idx="0"/>
+    <cs:fillRef idx="0"/>
+    <cs:effectRef idx="0"/>
+    <cs:fontRef idx="minor">
+      <a:schemeClr val="tx1">
+        <a:lumMod val="65000"/>
+        <a:lumOff val="35000"/>
+      </a:schemeClr>
+    </cs:fontRef>
+    <cs:defRPr sz="1197" kern="1200"/>
+  </cs:valueAxis>
+  <cs:wall>
+    <cs:lnRef idx="0"/>
+    <cs:fillRef idx="0"/>
+    <cs:effectRef idx="0"/>
+    <cs:fontRef idx="minor">
+      <a:schemeClr val="tx1"/>
+    </cs:fontRef>
+    <cs:spPr>
+      <a:noFill/>
+      <a:ln>
+        <a:noFill/>
+      </a:ln>
+    </cs:spPr>
+  </cs:wall>
+</cs:chartStyle>
+</file>
+
+<file path=ppt/charts/style3.xml><?xml version="1.0" encoding="utf-8"?>
+<cs:chartStyle xmlns:cs="http://schemas.microsoft.com/office/drawing/2012/chartStyle" xmlns:a="http://schemas.openxmlformats.org/drawingml/2006/main" id="201">
+  <cs:axisTitle>
+    <cs:lnRef idx="0"/>
+    <cs:fillRef idx="0"/>
+    <cs:effectRef idx="0"/>
+    <cs:fontRef idx="minor">
+      <a:schemeClr val="tx1">
+        <a:lumMod val="65000"/>
+        <a:lumOff val="35000"/>
+      </a:schemeClr>
+    </cs:fontRef>
+    <cs:defRPr sz="1330" kern="1200"/>
+  </cs:axisTitle>
+  <cs:categoryAxis>
+    <cs:lnRef idx="0"/>
+    <cs:fillRef idx="0"/>
+    <cs:effectRef idx="0"/>
+    <cs:fontRef idx="minor">
+      <a:schemeClr val="tx1">
+        <a:lumMod val="65000"/>
+        <a:lumOff val="35000"/>
+      </a:schemeClr>
+    </cs:fontRef>
+    <cs:spPr>
+      <a:ln w="9525" cap="flat" cmpd="sng" algn="ctr">
+        <a:solidFill>
+          <a:schemeClr val="tx1">
+            <a:lumMod val="15000"/>
+            <a:lumOff val="85000"/>
+          </a:schemeClr>
+        </a:solidFill>
+        <a:round/>
+      </a:ln>
+    </cs:spPr>
+    <cs:defRPr sz="1197" kern="1200"/>
+  </cs:categoryAxis>
+  <cs:chartArea mods="allowNoFillOverride allowNoLineOverride">
+    <cs:lnRef idx="0"/>
+    <cs:fillRef idx="0"/>
+    <cs:effectRef idx="0"/>
+    <cs:fontRef idx="minor">
+      <a:schemeClr val="tx1"/>
+    </cs:fontRef>
+    <cs:spPr>
+      <a:solidFill>
+        <a:schemeClr val="bg1"/>
+      </a:solidFill>
+      <a:ln w="9525" cap="flat" cmpd="sng" algn="ctr">
+        <a:solidFill>
+          <a:schemeClr val="tx1">
+            <a:lumMod val="15000"/>
+            <a:lumOff val="85000"/>
+          </a:schemeClr>
+        </a:solidFill>
+        <a:round/>
+      </a:ln>
+    </cs:spPr>
+    <cs:defRPr sz="1330" kern="1200"/>
+  </cs:chartArea>
+  <cs:dataLabel>
+    <cs:lnRef idx="0"/>
+    <cs:fillRef idx="0"/>
+    <cs:effectRef idx="0"/>
+    <cs:fontRef idx="minor">
+      <a:schemeClr val="tx1">
+        <a:lumMod val="75000"/>
+        <a:lumOff val="25000"/>
+      </a:schemeClr>
+    </cs:fontRef>
+    <cs:defRPr sz="1197" kern="1200"/>
+  </cs:dataLabel>
+  <cs:dataLabelCallout>
+    <cs:lnRef idx="0"/>
+    <cs:fillRef idx="0"/>
+    <cs:effectRef idx="0"/>
+    <cs:fontRef idx="minor">
+      <a:schemeClr val="dk1">
+        <a:lumMod val="65000"/>
+        <a:lumOff val="35000"/>
+      </a:schemeClr>
+    </cs:fontRef>
+    <cs:spPr>
+      <a:solidFill>
+        <a:schemeClr val="lt1"/>
+      </a:solidFill>
+      <a:ln>
+        <a:solidFill>
+          <a:schemeClr val="dk1">
+            <a:lumMod val="25000"/>
+            <a:lumOff val="75000"/>
+          </a:schemeClr>
+        </a:solidFill>
+      </a:ln>
+    </cs:spPr>
+    <cs:defRPr sz="1197" kern="1200"/>
+    <cs:bodyPr rot="0" spcFirstLastPara="1" vertOverflow="clip" horzOverflow="clip" vert="horz" wrap="square" lIns="36576" tIns="18288" rIns="36576" bIns="18288" anchor="ctr" anchorCtr="1">
+      <a:spAutoFit/>
+    </cs:bodyPr>
+  </cs:dataLabelCallout>
+  <cs:dataPoint>
+    <cs:lnRef idx="0"/>
+    <cs:fillRef idx="1">
+      <cs:styleClr val="auto"/>
+    </cs:fillRef>
+    <cs:effectRef idx="0"/>
+    <cs:fontRef idx="minor">
+      <a:schemeClr val="tx1"/>
+    </cs:fontRef>
+  </cs:dataPoint>
+  <cs:dataPoint3D>
+    <cs:lnRef idx="0"/>
+    <cs:fillRef idx="1">
+      <cs:styleClr val="auto"/>
+    </cs:fillRef>
+    <cs:effectRef idx="0"/>
+    <cs:fontRef idx="minor">
+      <a:schemeClr val="tx1"/>
+    </cs:fontRef>
+  </cs:dataPoint3D>
+  <cs:dataPointLine>
+    <cs:lnRef idx="0">
+      <cs:styleClr val="auto"/>
+    </cs:lnRef>
+    <cs:fillRef idx="1"/>
+    <cs:effectRef idx="0"/>
+    <cs:fontRef idx="minor">
+      <a:schemeClr val="tx1"/>
+    </cs:fontRef>
+    <cs:spPr>
+      <a:ln w="28575" cap="rnd">
+        <a:solidFill>
+          <a:schemeClr val="phClr"/>
+        </a:solidFill>
+        <a:round/>
+      </a:ln>
+    </cs:spPr>
+  </cs:dataPointLine>
+  <cs:dataPointMarker>
+    <cs:lnRef idx="0">
+      <cs:styleClr val="auto"/>
+    </cs:lnRef>
+    <cs:fillRef idx="1">
+      <cs:styleClr val="auto"/>
+    </cs:fillRef>
+    <cs:effectRef idx="0"/>
+    <cs:fontRef idx="minor">
+      <a:schemeClr val="tx1"/>
+    </cs:fontRef>
+    <cs:spPr>
+      <a:ln w="9525">
+        <a:solidFill>
+          <a:schemeClr val="phClr"/>
+        </a:solidFill>
+      </a:ln>
+    </cs:spPr>
+  </cs:dataPointMarker>
+  <cs:dataPointMarkerLayout symbol="circle" size="5"/>
+  <cs:dataPointWireframe>
+    <cs:lnRef idx="0">
+      <cs:styleClr val="auto"/>
+    </cs:lnRef>
+    <cs:fillRef idx="1"/>
+    <cs:effectRef idx="0"/>
+    <cs:fontRef idx="minor">
+      <a:schemeClr val="tx1"/>
+    </cs:fontRef>
+    <cs:spPr>
+      <a:ln w="9525" cap="rnd">
+        <a:solidFill>
+          <a:schemeClr val="phClr"/>
+        </a:solidFill>
+        <a:round/>
+      </a:ln>
+    </cs:spPr>
+  </cs:dataPointWireframe>
+  <cs:dataTable>
+    <cs:lnRef idx="0"/>
+    <cs:fillRef idx="0"/>
+    <cs:effectRef idx="0"/>
+    <cs:fontRef idx="minor">
+      <a:schemeClr val="tx1">
+        <a:lumMod val="65000"/>
+        <a:lumOff val="35000"/>
+      </a:schemeClr>
+    </cs:fontRef>
+    <cs:spPr>
+      <a:noFill/>
+      <a:ln w="9525" cap="flat" cmpd="sng" algn="ctr">
+        <a:solidFill>
+          <a:schemeClr val="tx1">
+            <a:lumMod val="15000"/>
+            <a:lumOff val="85000"/>
+          </a:schemeClr>
+        </a:solidFill>
+        <a:round/>
+      </a:ln>
+    </cs:spPr>
+    <cs:defRPr sz="1197" kern="1200"/>
+  </cs:dataTable>
+  <cs:downBar>
+    <cs:lnRef idx="0"/>
+    <cs:fillRef idx="0"/>
+    <cs:effectRef idx="0"/>
+    <cs:fontRef idx="minor">
+      <a:schemeClr val="dk1"/>
+    </cs:fontRef>
+    <cs:spPr>
+      <a:solidFill>
+        <a:schemeClr val="dk1">
+          <a:lumMod val="65000"/>
+          <a:lumOff val="35000"/>
+        </a:schemeClr>
+      </a:solidFill>
+      <a:ln w="9525">
+        <a:solidFill>
+          <a:schemeClr val="tx1">
+            <a:lumMod val="65000"/>
+            <a:lumOff val="35000"/>
+          </a:schemeClr>
+        </a:solidFill>
+      </a:ln>
+    </cs:spPr>
+  </cs:downBar>
+  <cs:dropLine>
+    <cs:lnRef idx="0"/>
+    <cs:fillRef idx="0"/>
+    <cs:effectRef idx="0"/>
+    <cs:fontRef idx="minor">
+      <a:schemeClr val="tx1"/>
+    </cs:fontRef>
+    <cs:spPr>
+      <a:ln w="9525" cap="flat" cmpd="sng" algn="ctr">
+        <a:solidFill>
+          <a:schemeClr val="tx1">
+            <a:lumMod val="35000"/>
+            <a:lumOff val="65000"/>
+          </a:schemeClr>
+        </a:solidFill>
+        <a:round/>
+      </a:ln>
+    </cs:spPr>
+  </cs:dropLine>
+  <cs:errorBar>
+    <cs:lnRef idx="0"/>
+    <cs:fillRef idx="0"/>
+    <cs:effectRef idx="0"/>
+    <cs:fontRef idx="minor">
+      <a:schemeClr val="tx1"/>
+    </cs:fontRef>
+    <cs:spPr>
+      <a:ln w="9525" cap="flat" cmpd="sng" algn="ctr">
+        <a:solidFill>
+          <a:schemeClr val="tx1">
+            <a:lumMod val="65000"/>
+            <a:lumOff val="35000"/>
+          </a:schemeClr>
+        </a:solidFill>
+        <a:round/>
+      </a:ln>
+    </cs:spPr>
+  </cs:errorBar>
+  <cs:floor>
+    <cs:lnRef idx="0"/>
+    <cs:fillRef idx="0"/>
+    <cs:effectRef idx="0"/>
+    <cs:fontRef idx="minor">
+      <a:schemeClr val="tx1"/>
+    </cs:fontRef>
+    <cs:spPr>
+      <a:noFill/>
+      <a:ln>
+        <a:noFill/>
+      </a:ln>
+    </cs:spPr>
+  </cs:floor>
+  <cs:gridlineMajor>
+    <cs:lnRef idx="0"/>
+    <cs:fillRef idx="0"/>
+    <cs:effectRef idx="0"/>
+    <cs:fontRef idx="minor">
+      <a:schemeClr val="tx1"/>
+    </cs:fontRef>
+    <cs:spPr>
+      <a:ln w="9525" cap="flat" cmpd="sng" algn="ctr">
+        <a:solidFill>
+          <a:schemeClr val="tx1">
+            <a:lumMod val="15000"/>
+            <a:lumOff val="85000"/>
+          </a:schemeClr>
+        </a:solidFill>
+        <a:round/>
+      </a:ln>
+    </cs:spPr>
+  </cs:gridlineMajor>
+  <cs:gridlineMinor>
+    <cs:lnRef idx="0"/>
+    <cs:fillRef idx="0"/>
+    <cs:effectRef idx="0"/>
+    <cs:fontRef idx="minor">
+      <a:schemeClr val="tx1"/>
+    </cs:fontRef>
+    <cs:spPr>
+      <a:ln w="9525" cap="flat" cmpd="sng" algn="ctr">
+        <a:solidFill>
+          <a:schemeClr val="tx1">
+            <a:lumMod val="5000"/>
+            <a:lumOff val="95000"/>
+          </a:schemeClr>
+        </a:solidFill>
+        <a:round/>
+      </a:ln>
+    </cs:spPr>
+  </cs:gridlineMinor>
+  <cs:hiLoLine>
+    <cs:lnRef idx="0"/>
+    <cs:fillRef idx="0"/>
+    <cs:effectRef idx="0"/>
+    <cs:fontRef idx="minor">
+      <a:schemeClr val="tx1"/>
+    </cs:fontRef>
+    <cs:spPr>
+      <a:ln w="9525" cap="flat" cmpd="sng" algn="ctr">
+        <a:solidFill>
+          <a:schemeClr val="tx1">
+            <a:lumMod val="75000"/>
+            <a:lumOff val="25000"/>
+          </a:schemeClr>
+        </a:solidFill>
+        <a:round/>
+      </a:ln>
+    </cs:spPr>
+  </cs:hiLoLine>
+  <cs:leaderLine>
+    <cs:lnRef idx="0"/>
+    <cs:fillRef idx="0"/>
+    <cs:effectRef idx="0"/>
+    <cs:fontRef idx="minor">
+      <a:schemeClr val="tx1"/>
+    </cs:fontRef>
+    <cs:spPr>
+      <a:ln w="9525" cap="flat" cmpd="sng" algn="ctr">
+        <a:solidFill>
+          <a:schemeClr val="tx1">
+            <a:lumMod val="35000"/>
+            <a:lumOff val="65000"/>
+          </a:schemeClr>
+        </a:solidFill>
+        <a:round/>
+      </a:ln>
+    </cs:spPr>
+  </cs:leaderLine>
+  <cs:legend>
+    <cs:lnRef idx="0"/>
+    <cs:fillRef idx="0"/>
+    <cs:effectRef idx="0"/>
+    <cs:fontRef idx="minor">
+      <a:schemeClr val="tx1">
+        <a:lumMod val="65000"/>
+        <a:lumOff val="35000"/>
+      </a:schemeClr>
+    </cs:fontRef>
+    <cs:defRPr sz="1197" kern="1200"/>
+  </cs:legend>
+  <cs:plotArea mods="allowNoFillOverride allowNoLineOverride">
+    <cs:lnRef idx="0"/>
+    <cs:fillRef idx="0"/>
+    <cs:effectRef idx="0"/>
+    <cs:fontRef idx="minor">
+      <a:schemeClr val="tx1"/>
+    </cs:fontRef>
+  </cs:plotArea>
+  <cs:plotArea3D mods="allowNoFillOverride allowNoLineOverride">
+    <cs:lnRef idx="0"/>
+    <cs:fillRef idx="0"/>
+    <cs:effectRef idx="0"/>
+    <cs:fontRef idx="minor">
+      <a:schemeClr val="tx1"/>
+    </cs:fontRef>
+  </cs:plotArea3D>
+  <cs:seriesAxis>
+    <cs:lnRef idx="0"/>
+    <cs:fillRef idx="0"/>
+    <cs:effectRef idx="0"/>
+    <cs:fontRef idx="minor">
+      <a:schemeClr val="tx1">
+        <a:lumMod val="65000"/>
+        <a:lumOff val="35000"/>
+      </a:schemeClr>
+    </cs:fontRef>
+    <cs:defRPr sz="1197" kern="1200"/>
+  </cs:seriesAxis>
+  <cs:seriesLine>
+    <cs:lnRef idx="0"/>
+    <cs:fillRef idx="0"/>
+    <cs:effectRef idx="0"/>
+    <cs:fontRef idx="minor">
+      <a:schemeClr val="tx1"/>
+    </cs:fontRef>
+    <cs:spPr>
+      <a:ln w="9525" cap="flat" cmpd="sng" algn="ctr">
+        <a:solidFill>
+          <a:schemeClr val="tx1">
+            <a:lumMod val="35000"/>
+            <a:lumOff val="65000"/>
+          </a:schemeClr>
+        </a:solidFill>
+        <a:round/>
+      </a:ln>
+    </cs:spPr>
+  </cs:seriesLine>
+  <cs:title>
+    <cs:lnRef idx="0"/>
+    <cs:fillRef idx="0"/>
+    <cs:effectRef idx="0"/>
+    <cs:fontRef idx="minor">
+      <a:schemeClr val="tx1">
+        <a:lumMod val="65000"/>
+        <a:lumOff val="35000"/>
+      </a:schemeClr>
+    </cs:fontRef>
+    <cs:defRPr sz="1862" b="0" kern="1200" spc="0" baseline="0"/>
+  </cs:title>
+  <cs:trendline>
+    <cs:lnRef idx="0">
+      <cs:styleClr val="auto"/>
+    </cs:lnRef>
+    <cs:fillRef idx="0"/>
+    <cs:effectRef idx="0"/>
+    <cs:fontRef idx="minor">
+      <a:schemeClr val="tx1"/>
+    </cs:fontRef>
+    <cs:spPr>
+      <a:ln w="19050" cap="rnd">
+        <a:solidFill>
+          <a:schemeClr val="phClr"/>
+        </a:solidFill>
+        <a:prstDash val="sysDot"/>
+      </a:ln>
+    </cs:spPr>
+  </cs:trendline>
+  <cs:trendlineLabel>
+    <cs:lnRef idx="0"/>
+    <cs:fillRef idx="0"/>
+    <cs:effectRef idx="0"/>
+    <cs:fontRef idx="minor">
+      <a:schemeClr val="tx1">
+        <a:lumMod val="65000"/>
+        <a:lumOff val="35000"/>
+      </a:schemeClr>
+    </cs:fontRef>
+    <cs:defRPr sz="1197" kern="1200"/>
+  </cs:trendlineLabel>
+  <cs:upBar>
+    <cs:lnRef idx="0"/>
+    <cs:fillRef idx="0"/>
+    <cs:effectRef idx="0"/>
+    <cs:fontRef idx="minor">
+      <a:schemeClr val="dk1"/>
+    </cs:fontRef>
+    <cs:spPr>
+      <a:solidFill>
+        <a:schemeClr val="lt1"/>
+      </a:solidFill>
+      <a:ln w="9525">
+        <a:solidFill>
+          <a:schemeClr val="tx1">
+            <a:lumMod val="15000"/>
+            <a:lumOff val="85000"/>
+          </a:schemeClr>
+        </a:solidFill>
+      </a:ln>
+    </cs:spPr>
+  </cs:upBar>
+  <cs:valueAxis>
+    <cs:lnRef idx="0"/>
+    <cs:fillRef idx="0"/>
+    <cs:effectRef idx="0"/>
+    <cs:fontRef idx="minor">
+      <a:schemeClr val="tx1">
+        <a:lumMod val="65000"/>
+        <a:lumOff val="35000"/>
+      </a:schemeClr>
+    </cs:fontRef>
+    <cs:defRPr sz="1197" kern="1200"/>
+  </cs:valueAxis>
+  <cs:wall>
+    <cs:lnRef idx="0"/>
+    <cs:fillRef idx="0"/>
+    <cs:effectRef idx="0"/>
+    <cs:fontRef idx="minor">
+      <a:schemeClr val="tx1"/>
+    </cs:fontRef>
+    <cs:spPr>
+      <a:noFill/>
+      <a:ln>
+        <a:noFill/>
+      </a:ln>
+    </cs:spPr>
+  </cs:wall>
+</cs:chartStyle>
+</file>
+
+<file path=ppt/charts/style4.xml><?xml version="1.0" encoding="utf-8"?>
 <cs:chartStyle xmlns:cs="http://schemas.microsoft.com/office/drawing/2012/chartStyle" xmlns:a="http://schemas.openxmlformats.org/drawingml/2006/main" id="201">
   <cs:axisTitle>
     <cs:lnRef idx="0"/>
@@ -2475,7 +4706,7 @@
           <a:p>
             <a:fld id="{216FD8EB-7C38-4D9D-8BDF-3ABF2096B376}" type="datetimeFigureOut">
               <a:rPr kumimoji="1" lang="ja-JP" altLang="en-US" smtClean="0"/>
-              <a:t>2017/7/12</a:t>
+              <a:t>2017/7/18</a:t>
             </a:fld>
             <a:endParaRPr kumimoji="1" lang="ja-JP" altLang="en-US" dirty="0"/>
           </a:p>
@@ -2677,7 +4908,7 @@
           <a:p>
             <a:fld id="{216FD8EB-7C38-4D9D-8BDF-3ABF2096B376}" type="datetimeFigureOut">
               <a:rPr kumimoji="1" lang="ja-JP" altLang="en-US" smtClean="0"/>
-              <a:t>2017/7/12</a:t>
+              <a:t>2017/7/18</a:t>
             </a:fld>
             <a:endParaRPr kumimoji="1" lang="ja-JP" altLang="en-US" dirty="0"/>
           </a:p>
@@ -2889,7 +5120,7 @@
           <a:p>
             <a:fld id="{216FD8EB-7C38-4D9D-8BDF-3ABF2096B376}" type="datetimeFigureOut">
               <a:rPr kumimoji="1" lang="ja-JP" altLang="en-US" smtClean="0"/>
-              <a:t>2017/7/12</a:t>
+              <a:t>2017/7/18</a:t>
             </a:fld>
             <a:endParaRPr kumimoji="1" lang="ja-JP" altLang="en-US" dirty="0"/>
           </a:p>
@@ -3091,7 +5322,7 @@
           <a:p>
             <a:fld id="{216FD8EB-7C38-4D9D-8BDF-3ABF2096B376}" type="datetimeFigureOut">
               <a:rPr kumimoji="1" lang="ja-JP" altLang="en-US" smtClean="0"/>
-              <a:t>2017/7/12</a:t>
+              <a:t>2017/7/18</a:t>
             </a:fld>
             <a:endParaRPr kumimoji="1" lang="ja-JP" altLang="en-US" dirty="0"/>
           </a:p>
@@ -3337,7 +5568,7 @@
           <a:p>
             <a:fld id="{216FD8EB-7C38-4D9D-8BDF-3ABF2096B376}" type="datetimeFigureOut">
               <a:rPr kumimoji="1" lang="ja-JP" altLang="en-US" smtClean="0"/>
-              <a:t>2017/7/12</a:t>
+              <a:t>2017/7/18</a:t>
             </a:fld>
             <a:endParaRPr kumimoji="1" lang="ja-JP" altLang="en-US" dirty="0"/>
           </a:p>
@@ -3633,7 +5864,7 @@
           <a:p>
             <a:fld id="{216FD8EB-7C38-4D9D-8BDF-3ABF2096B376}" type="datetimeFigureOut">
               <a:rPr kumimoji="1" lang="ja-JP" altLang="en-US" smtClean="0"/>
-              <a:t>2017/7/12</a:t>
+              <a:t>2017/7/18</a:t>
             </a:fld>
             <a:endParaRPr kumimoji="1" lang="ja-JP" altLang="en-US" dirty="0"/>
           </a:p>
@@ -4064,7 +6295,7 @@
           <a:p>
             <a:fld id="{216FD8EB-7C38-4D9D-8BDF-3ABF2096B376}" type="datetimeFigureOut">
               <a:rPr kumimoji="1" lang="ja-JP" altLang="en-US" smtClean="0"/>
-              <a:t>2017/7/12</a:t>
+              <a:t>2017/7/18</a:t>
             </a:fld>
             <a:endParaRPr kumimoji="1" lang="ja-JP" altLang="en-US" dirty="0"/>
           </a:p>
@@ -4182,7 +6413,7 @@
           <a:p>
             <a:fld id="{216FD8EB-7C38-4D9D-8BDF-3ABF2096B376}" type="datetimeFigureOut">
               <a:rPr kumimoji="1" lang="ja-JP" altLang="en-US" smtClean="0"/>
-              <a:t>2017/7/12</a:t>
+              <a:t>2017/7/18</a:t>
             </a:fld>
             <a:endParaRPr kumimoji="1" lang="ja-JP" altLang="en-US" dirty="0"/>
           </a:p>
@@ -4277,7 +6508,7 @@
           <a:p>
             <a:fld id="{216FD8EB-7C38-4D9D-8BDF-3ABF2096B376}" type="datetimeFigureOut">
               <a:rPr kumimoji="1" lang="ja-JP" altLang="en-US" smtClean="0"/>
-              <a:t>2017/7/12</a:t>
+              <a:t>2017/7/18</a:t>
             </a:fld>
             <a:endParaRPr kumimoji="1" lang="ja-JP" altLang="en-US" dirty="0"/>
           </a:p>
@@ -4586,7 +6817,7 @@
           <a:p>
             <a:fld id="{216FD8EB-7C38-4D9D-8BDF-3ABF2096B376}" type="datetimeFigureOut">
               <a:rPr kumimoji="1" lang="ja-JP" altLang="en-US" smtClean="0"/>
-              <a:t>2017/7/12</a:t>
+              <a:t>2017/7/18</a:t>
             </a:fld>
             <a:endParaRPr kumimoji="1" lang="ja-JP" altLang="en-US" dirty="0"/>
           </a:p>
@@ -4839,7 +7070,7 @@
           <a:p>
             <a:fld id="{216FD8EB-7C38-4D9D-8BDF-3ABF2096B376}" type="datetimeFigureOut">
               <a:rPr kumimoji="1" lang="ja-JP" altLang="en-US" smtClean="0"/>
-              <a:t>2017/7/12</a:t>
+              <a:t>2017/7/18</a:t>
             </a:fld>
             <a:endParaRPr kumimoji="1" lang="ja-JP" altLang="en-US" dirty="0"/>
           </a:p>
@@ -5084,7 +7315,7 @@
           <a:p>
             <a:fld id="{216FD8EB-7C38-4D9D-8BDF-3ABF2096B376}" type="datetimeFigureOut">
               <a:rPr kumimoji="1" lang="ja-JP" altLang="en-US" smtClean="0"/>
-              <a:t>2017/7/12</a:t>
+              <a:t>2017/7/18</a:t>
             </a:fld>
             <a:endParaRPr kumimoji="1" lang="ja-JP" altLang="en-US" dirty="0"/>
           </a:p>
@@ -5612,11 +7843,7 @@
             </a:r>
             <a:r>
               <a:rPr lang="ja-JP" altLang="en-US" b="1" dirty="0" smtClean="0"/>
-              <a:t>します</a:t>
-            </a:r>
-            <a:r>
-              <a:rPr lang="ja-JP" altLang="en-US" b="1" dirty="0" smtClean="0"/>
-              <a:t>。</a:t>
+              <a:t>します。</a:t>
             </a:r>
             <a:endParaRPr lang="en-US" altLang="ja-JP" b="1" dirty="0" smtClean="0"/>
           </a:p>
@@ -5728,7 +7955,6 @@
               <a:rPr lang="ja-JP" altLang="en-US" b="1" dirty="0" smtClean="0"/>
               <a:t>。</a:t>
             </a:r>
-            <a:endParaRPr lang="ja-JP" altLang="en-US" b="1" dirty="0" smtClean="0"/>
           </a:p>
         </p:txBody>
       </p:sp>
@@ -5755,15 +7981,7 @@
           <a:p>
             <a:r>
               <a:rPr lang="en-US" altLang="ja-JP" dirty="0" smtClean="0"/>
-              <a:t>{</a:t>
-            </a:r>
-            <a:r>
-              <a:rPr lang="en-US" altLang="ja-JP" dirty="0" smtClean="0"/>
-              <a:t>id:p01</a:t>
-            </a:r>
-            <a:r>
-              <a:rPr lang="en-US" altLang="ja-JP" dirty="0" smtClean="0"/>
-              <a:t>}</a:t>
+              <a:t>{id:p01}</a:t>
             </a:r>
             <a:endParaRPr lang="ja-JP" altLang="en-US" dirty="0"/>
           </a:p>
@@ -5845,15 +8063,7 @@
           <a:p>
             <a:r>
               <a:rPr lang="en-US" altLang="ja-JP" dirty="0" smtClean="0"/>
-              <a:t>{</a:t>
-            </a:r>
-            <a:r>
-              <a:rPr lang="en-US" altLang="ja-JP" dirty="0" smtClean="0"/>
-              <a:t>id:p02</a:t>
-            </a:r>
-            <a:r>
-              <a:rPr lang="en-US" altLang="ja-JP" dirty="0" smtClean="0"/>
-              <a:t>}</a:t>
+              <a:t>{id:p02}</a:t>
             </a:r>
             <a:endParaRPr lang="ja-JP" altLang="en-US" dirty="0"/>
           </a:p>
@@ -5867,7 +8077,7 @@
         </p:nvSpPr>
         <p:spPr>
           <a:xfrm>
-            <a:off x="6224451" y="1690688"/>
+            <a:off x="6224451" y="1321356"/>
             <a:ext cx="1226618" cy="369332"/>
           </a:xfrm>
           <a:prstGeom prst="rect">
@@ -5897,7 +8107,7 @@
         </p:nvSpPr>
         <p:spPr>
           <a:xfrm>
-            <a:off x="838200" y="1690688"/>
+            <a:off x="838200" y="1321356"/>
             <a:ext cx="902811" cy="369332"/>
           </a:xfrm>
           <a:prstGeom prst="rect">
@@ -5926,14 +8136,14 @@
           <p:nvPr>
             <p:extLst>
               <p:ext uri="{D42A27DB-BD31-4B8C-83A1-F6EECF244321}">
-                <p14:modId xmlns:p14="http://schemas.microsoft.com/office/powerpoint/2010/main" val="3734359982"/>
+                <p14:modId xmlns:p14="http://schemas.microsoft.com/office/powerpoint/2010/main" val="476657524"/>
               </p:ext>
             </p:extLst>
           </p:nvPr>
         </p:nvGraphicFramePr>
         <p:xfrm>
-          <a:off x="838200" y="2318798"/>
-          <a:ext cx="4752703" cy="3716249"/>
+          <a:off x="838200" y="1836249"/>
+          <a:ext cx="4752703" cy="2418665"/>
         </p:xfrm>
         <a:graphic>
           <a:graphicData uri="http://schemas.openxmlformats.org/drawingml/2006/chart">
@@ -5948,18 +8158,62 @@
           <p:nvPr>
             <p:extLst>
               <p:ext uri="{D42A27DB-BD31-4B8C-83A1-F6EECF244321}">
-                <p14:modId xmlns:p14="http://schemas.microsoft.com/office/powerpoint/2010/main" val="3199301500"/>
+                <p14:modId xmlns:p14="http://schemas.microsoft.com/office/powerpoint/2010/main" val="947706247"/>
               </p:ext>
             </p:extLst>
           </p:nvPr>
         </p:nvGraphicFramePr>
         <p:xfrm>
-          <a:off x="6096000" y="2318797"/>
-          <a:ext cx="4752703" cy="3716249"/>
+          <a:off x="6096000" y="1836248"/>
+          <a:ext cx="4752703" cy="2418665"/>
         </p:xfrm>
         <a:graphic>
           <a:graphicData uri="http://schemas.openxmlformats.org/drawingml/2006/chart">
             <c:chart xmlns:c="http://schemas.openxmlformats.org/drawingml/2006/chart" xmlns:r="http://schemas.openxmlformats.org/officeDocument/2006/relationships" r:id="rId3"/>
+          </a:graphicData>
+        </a:graphic>
+      </p:graphicFrame>
+      <p:graphicFrame>
+        <p:nvGraphicFramePr>
+          <p:cNvPr id="9" name="グラフ 8"/>
+          <p:cNvGraphicFramePr/>
+          <p:nvPr>
+            <p:extLst>
+              <p:ext uri="{D42A27DB-BD31-4B8C-83A1-F6EECF244321}">
+                <p14:modId xmlns:p14="http://schemas.microsoft.com/office/powerpoint/2010/main" val="605997135"/>
+              </p:ext>
+            </p:extLst>
+          </p:nvPr>
+        </p:nvGraphicFramePr>
+        <p:xfrm>
+          <a:off x="838200" y="4254914"/>
+          <a:ext cx="4752703" cy="2418665"/>
+        </p:xfrm>
+        <a:graphic>
+          <a:graphicData uri="http://schemas.openxmlformats.org/drawingml/2006/chart">
+            <c:chart xmlns:c="http://schemas.openxmlformats.org/drawingml/2006/chart" xmlns:r="http://schemas.openxmlformats.org/officeDocument/2006/relationships" r:id="rId4"/>
+          </a:graphicData>
+        </a:graphic>
+      </p:graphicFrame>
+      <p:graphicFrame>
+        <p:nvGraphicFramePr>
+          <p:cNvPr id="10" name="グラフ 9"/>
+          <p:cNvGraphicFramePr/>
+          <p:nvPr>
+            <p:extLst>
+              <p:ext uri="{D42A27DB-BD31-4B8C-83A1-F6EECF244321}">
+                <p14:modId xmlns:p14="http://schemas.microsoft.com/office/powerpoint/2010/main" val="613708461"/>
+              </p:ext>
+            </p:extLst>
+          </p:nvPr>
+        </p:nvGraphicFramePr>
+        <p:xfrm>
+          <a:off x="6096000" y="4254913"/>
+          <a:ext cx="4752703" cy="2418665"/>
+        </p:xfrm>
+        <a:graphic>
+          <a:graphicData uri="http://schemas.openxmlformats.org/drawingml/2006/chart">
+            <c:chart xmlns:c="http://schemas.openxmlformats.org/drawingml/2006/chart" xmlns:r="http://schemas.openxmlformats.org/officeDocument/2006/relationships" r:id="rId5"/>
           </a:graphicData>
         </a:graphic>
       </p:graphicFrame>

</xml_diff>

<commit_message>
No longer create working tsv files
</commit_message>
<xml_diff>
--- a/test/data2/in.pptx
+++ b/test/data2/in.pptx
@@ -1078,7 +1078,7 @@
         <c:scaling>
           <c:orientation val="minMax"/>
           <c:max val="150"/>
-          <c:min val="50"/>
+          <c:min val="0"/>
         </c:scaling>
         <c:delete val="0"/>
         <c:axPos val="l"/>
@@ -2223,7 +2223,7 @@
         <c:scaling>
           <c:orientation val="minMax"/>
           <c:max val="150"/>
-          <c:min val="50"/>
+          <c:min val="0"/>
         </c:scaling>
         <c:delete val="0"/>
         <c:axPos val="l"/>

</xml_diff>